<commit_message>
revise chapter 1 and 5
</commit_message>
<xml_diff>
--- a/pics/p4.pptx
+++ b/pics/p4.pptx
@@ -104,6 +104,11 @@
       </a:defRPr>
     </a:lvl9pPr>
   </p:defaultTextStyle>
+  <p:extLst>
+    <p:ext uri="{EFAFB233-063F-42B5-8137-9DF3F51BA10A}">
+      <p15:sldGuideLst xmlns:p15="http://schemas.microsoft.com/office/powerpoint/2012/main"/>
+    </p:ext>
+  </p:extLst>
 </p:presentation>
 </file>
 
@@ -1161,7 +1166,15 @@
         <a:p>
           <a:r>
             <a:rPr lang="en-US" sz="2400" dirty="0" smtClean="0"/>
-            <a:t>Modeling Material in High Order Element</a:t>
+            <a:t>Modeling Material in </a:t>
+          </a:r>
+          <a:r>
+            <a:rPr lang="en-US" sz="2400" smtClean="0"/>
+            <a:t>High </a:t>
+          </a:r>
+          <a:r>
+            <a:rPr lang="en-US" sz="2400" smtClean="0"/>
+            <a:t>Order Finite Elements</a:t>
           </a:r>
           <a:endParaRPr lang="en-US" sz="2400" dirty="0"/>
         </a:p>
@@ -1244,6 +1257,13 @@
         </dgm:presLayoutVars>
       </dgm:prSet>
       <dgm:spPr/>
+      <dgm:t>
+        <a:bodyPr/>
+        <a:lstStyle/>
+        <a:p>
+          <a:endParaRPr lang="en-US"/>
+        </a:p>
+      </dgm:t>
     </dgm:pt>
     <dgm:pt modelId="{842D559A-A435-C44B-8C1C-4B39215A6A1F}" type="pres">
       <dgm:prSet presAssocID="{4B51C2DC-089F-DC4F-9D3B-5F37159BD893}" presName="parentLin" presStyleCnt="0"/>
@@ -1252,6 +1272,13 @@
     <dgm:pt modelId="{CA7FE6FA-D771-0140-8640-7276F1908E21}" type="pres">
       <dgm:prSet presAssocID="{4B51C2DC-089F-DC4F-9D3B-5F37159BD893}" presName="parentLeftMargin" presStyleLbl="node1" presStyleIdx="0" presStyleCnt="3"/>
       <dgm:spPr/>
+      <dgm:t>
+        <a:bodyPr/>
+        <a:lstStyle/>
+        <a:p>
+          <a:endParaRPr lang="en-US"/>
+        </a:p>
+      </dgm:t>
     </dgm:pt>
     <dgm:pt modelId="{8F38CEAE-D9A9-264B-AB50-62725BF70CA1}" type="pres">
       <dgm:prSet presAssocID="{4B51C2DC-089F-DC4F-9D3B-5F37159BD893}" presName="parentText" presStyleLbl="node1" presStyleIdx="0" presStyleCnt="3" custScaleX="41786" custScaleY="56671">
@@ -1280,6 +1307,13 @@
         </dgm:presLayoutVars>
       </dgm:prSet>
       <dgm:spPr/>
+      <dgm:t>
+        <a:bodyPr/>
+        <a:lstStyle/>
+        <a:p>
+          <a:endParaRPr lang="en-US"/>
+        </a:p>
+      </dgm:t>
     </dgm:pt>
     <dgm:pt modelId="{C1E1146B-4D6F-9544-AE5F-37C01327A17F}" type="pres">
       <dgm:prSet presAssocID="{61BF8A95-8825-0641-A783-C3ABDAACE625}" presName="spaceBetweenRectangles" presStyleCnt="0"/>
@@ -1292,6 +1326,13 @@
     <dgm:pt modelId="{D1494240-428D-B34C-87DA-3F6DE2747342}" type="pres">
       <dgm:prSet presAssocID="{F2BE4290-FAEF-FF49-A400-06D6B16F9F1E}" presName="parentLeftMargin" presStyleLbl="node1" presStyleIdx="0" presStyleCnt="3"/>
       <dgm:spPr/>
+      <dgm:t>
+        <a:bodyPr/>
+        <a:lstStyle/>
+        <a:p>
+          <a:endParaRPr lang="en-US"/>
+        </a:p>
+      </dgm:t>
     </dgm:pt>
     <dgm:pt modelId="{248E57EF-FFDF-CC47-84B7-BA2F63B1E2A8}" type="pres">
       <dgm:prSet presAssocID="{F2BE4290-FAEF-FF49-A400-06D6B16F9F1E}" presName="parentText" presStyleLbl="node1" presStyleIdx="1" presStyleCnt="3" custScaleX="51479" custScaleY="56789">
@@ -1301,6 +1342,13 @@
         </dgm:presLayoutVars>
       </dgm:prSet>
       <dgm:spPr/>
+      <dgm:t>
+        <a:bodyPr/>
+        <a:lstStyle/>
+        <a:p>
+          <a:endParaRPr lang="en-US"/>
+        </a:p>
+      </dgm:t>
     </dgm:pt>
     <dgm:pt modelId="{EB796227-4B84-F243-9E30-438423C89C31}" type="pres">
       <dgm:prSet presAssocID="{F2BE4290-FAEF-FF49-A400-06D6B16F9F1E}" presName="negativeSpace" presStyleCnt="0"/>
@@ -1313,6 +1361,13 @@
         </dgm:presLayoutVars>
       </dgm:prSet>
       <dgm:spPr/>
+      <dgm:t>
+        <a:bodyPr/>
+        <a:lstStyle/>
+        <a:p>
+          <a:endParaRPr lang="en-US"/>
+        </a:p>
+      </dgm:t>
     </dgm:pt>
     <dgm:pt modelId="{5E30338C-2952-8640-BD47-41102B320948}" type="pres">
       <dgm:prSet presAssocID="{5E41C29A-8D87-DE43-BF6B-418C4DA38B5B}" presName="spaceBetweenRectangles" presStyleCnt="0"/>
@@ -1325,6 +1380,13 @@
     <dgm:pt modelId="{064F80DB-9EBB-F549-BBEE-9905D7505777}" type="pres">
       <dgm:prSet presAssocID="{9B149980-5306-8441-B102-35092777BA85}" presName="parentLeftMargin" presStyleLbl="node1" presStyleIdx="1" presStyleCnt="3"/>
       <dgm:spPr/>
+      <dgm:t>
+        <a:bodyPr/>
+        <a:lstStyle/>
+        <a:p>
+          <a:endParaRPr lang="en-US"/>
+        </a:p>
+      </dgm:t>
     </dgm:pt>
     <dgm:pt modelId="{7C78A472-F421-2A4B-AE70-CB431D1BB48A}" type="pres">
       <dgm:prSet presAssocID="{9B149980-5306-8441-B102-35092777BA85}" presName="parentText" presStyleLbl="node1" presStyleIdx="2" presStyleCnt="3" custScaleX="61071" custScaleY="56789">
@@ -1334,6 +1396,13 @@
         </dgm:presLayoutVars>
       </dgm:prSet>
       <dgm:spPr/>
+      <dgm:t>
+        <a:bodyPr/>
+        <a:lstStyle/>
+        <a:p>
+          <a:endParaRPr lang="en-US"/>
+        </a:p>
+      </dgm:t>
     </dgm:pt>
     <dgm:pt modelId="{40217FF8-C11B-8645-8F15-23069ABA3A4C}" type="pres">
       <dgm:prSet presAssocID="{9B149980-5306-8441-B102-35092777BA85}" presName="negativeSpace" presStyleCnt="0"/>
@@ -1346,27 +1415,34 @@
         </dgm:presLayoutVars>
       </dgm:prSet>
       <dgm:spPr/>
+      <dgm:t>
+        <a:bodyPr/>
+        <a:lstStyle/>
+        <a:p>
+          <a:endParaRPr lang="en-US"/>
+        </a:p>
+      </dgm:t>
     </dgm:pt>
   </dgm:ptLst>
   <dgm:cxnLst>
+    <dgm:cxn modelId="{CE24C156-2AD3-1446-BED7-AB8BAF976D46}" type="presOf" srcId="{9B149980-5306-8441-B102-35092777BA85}" destId="{064F80DB-9EBB-F549-BBEE-9905D7505777}" srcOrd="0" destOrd="0" presId="urn:microsoft.com/office/officeart/2005/8/layout/list1"/>
+    <dgm:cxn modelId="{A5317015-3D79-EF47-8FBA-B6EE032EB3C1}" srcId="{CEC49DEC-29F7-704F-AFA7-570430518BC0}" destId="{4B51C2DC-089F-DC4F-9D3B-5F37159BD893}" srcOrd="0" destOrd="0" parTransId="{C60A2618-28DF-5146-8038-C3EECF17F428}" sibTransId="{61BF8A95-8825-0641-A783-C3ABDAACE625}"/>
+    <dgm:cxn modelId="{E4239912-633C-6F4F-B4A9-F989C5BA464C}" type="presOf" srcId="{F2BE4290-FAEF-FF49-A400-06D6B16F9F1E}" destId="{D1494240-428D-B34C-87DA-3F6DE2747342}" srcOrd="0" destOrd="0" presId="urn:microsoft.com/office/officeart/2005/8/layout/list1"/>
+    <dgm:cxn modelId="{B9B1EB60-0E60-BE45-9560-7F073EDCD43E}" srcId="{4B51C2DC-089F-DC4F-9D3B-5F37159BD893}" destId="{94E7F4D4-B5E2-A947-9557-7339305979D9}" srcOrd="1" destOrd="0" parTransId="{1C381E02-608E-0043-85DD-925971C15BE9}" sibTransId="{475785E0-3E80-4C43-9F19-C9747AECB88E}"/>
+    <dgm:cxn modelId="{17018853-05EB-134B-B6F9-C8D998B60007}" type="presOf" srcId="{CEC49DEC-29F7-704F-AFA7-570430518BC0}" destId="{BE54A789-0906-524E-9A8F-7EA99DC78B85}" srcOrd="0" destOrd="0" presId="urn:microsoft.com/office/officeart/2005/8/layout/list1"/>
+    <dgm:cxn modelId="{53F407C2-AB04-9942-BA39-A7A629CA254A}" srcId="{4B51C2DC-089F-DC4F-9D3B-5F37159BD893}" destId="{8C5C17AB-74AF-864C-97A4-9C52EE74445C}" srcOrd="0" destOrd="0" parTransId="{A47607F0-A8FC-D147-A082-3F91295D9C01}" sibTransId="{8905ACC9-215D-1B45-8E72-85EECB1FFDDE}"/>
+    <dgm:cxn modelId="{0F6B9C18-2D06-1149-A1DF-89F34B52AEB4}" type="presOf" srcId="{9B149980-5306-8441-B102-35092777BA85}" destId="{7C78A472-F421-2A4B-AE70-CB431D1BB48A}" srcOrd="1" destOrd="0" presId="urn:microsoft.com/office/officeart/2005/8/layout/list1"/>
+    <dgm:cxn modelId="{C79B8A15-8693-3C4C-83DE-433BAF50B658}" type="presOf" srcId="{4B51C2DC-089F-DC4F-9D3B-5F37159BD893}" destId="{CA7FE6FA-D771-0140-8640-7276F1908E21}" srcOrd="0" destOrd="0" presId="urn:microsoft.com/office/officeart/2005/8/layout/list1"/>
+    <dgm:cxn modelId="{15A4C690-FCCF-F44B-B0B3-3ACBAD4FE2DB}" srcId="{CEC49DEC-29F7-704F-AFA7-570430518BC0}" destId="{9B149980-5306-8441-B102-35092777BA85}" srcOrd="2" destOrd="0" parTransId="{560535B4-A026-1244-B491-76B268B4B6BC}" sibTransId="{6F70CDA2-EBD9-F547-A43A-071F49CB11CF}"/>
+    <dgm:cxn modelId="{5D75B00A-724D-394C-AF20-E6EDFCE5489F}" type="presOf" srcId="{8C5C17AB-74AF-864C-97A4-9C52EE74445C}" destId="{72A53F43-98E3-CB4A-9CC4-7D6E3A7E2D1D}" srcOrd="0" destOrd="0" presId="urn:microsoft.com/office/officeart/2005/8/layout/list1"/>
+    <dgm:cxn modelId="{3BC73166-C8EC-4840-8486-7227D155AF59}" srcId="{9B149980-5306-8441-B102-35092777BA85}" destId="{050F4C5F-A99C-4244-A973-B7746B9E72DA}" srcOrd="0" destOrd="0" parTransId="{2C951978-DD06-5A48-A9F3-1C62358C8F4B}" sibTransId="{91248C81-3F78-564A-937F-7DA63BC02072}"/>
     <dgm:cxn modelId="{8DD6888E-6ECC-D848-BE1D-E002DEBCC3F5}" type="presOf" srcId="{94E7F4D4-B5E2-A947-9557-7339305979D9}" destId="{72A53F43-98E3-CB4A-9CC4-7D6E3A7E2D1D}" srcOrd="0" destOrd="1" presId="urn:microsoft.com/office/officeart/2005/8/layout/list1"/>
-    <dgm:cxn modelId="{C79B8A15-8693-3C4C-83DE-433BAF50B658}" type="presOf" srcId="{4B51C2DC-089F-DC4F-9D3B-5F37159BD893}" destId="{CA7FE6FA-D771-0140-8640-7276F1908E21}" srcOrd="0" destOrd="0" presId="urn:microsoft.com/office/officeart/2005/8/layout/list1"/>
-    <dgm:cxn modelId="{B9B1EB60-0E60-BE45-9560-7F073EDCD43E}" srcId="{4B51C2DC-089F-DC4F-9D3B-5F37159BD893}" destId="{94E7F4D4-B5E2-A947-9557-7339305979D9}" srcOrd="1" destOrd="0" parTransId="{1C381E02-608E-0043-85DD-925971C15BE9}" sibTransId="{475785E0-3E80-4C43-9F19-C9747AECB88E}"/>
+    <dgm:cxn modelId="{5DD518E5-ED30-A548-BD3D-6D507B3C18D5}" type="presOf" srcId="{4B51C2DC-089F-DC4F-9D3B-5F37159BD893}" destId="{8F38CEAE-D9A9-264B-AB50-62725BF70CA1}" srcOrd="1" destOrd="0" presId="urn:microsoft.com/office/officeart/2005/8/layout/list1"/>
+    <dgm:cxn modelId="{B042DE4E-0FFD-9B47-957D-EBA8F84BB1F5}" type="presOf" srcId="{F2BE4290-FAEF-FF49-A400-06D6B16F9F1E}" destId="{248E57EF-FFDF-CC47-84B7-BA2F63B1E2A8}" srcOrd="1" destOrd="0" presId="urn:microsoft.com/office/officeart/2005/8/layout/list1"/>
+    <dgm:cxn modelId="{6A936DD8-F853-A147-B8BF-404D6BE0D56E}" srcId="{F2BE4290-FAEF-FF49-A400-06D6B16F9F1E}" destId="{D65EF31D-B16F-CF40-A896-9D66DA7D3458}" srcOrd="0" destOrd="0" parTransId="{A13CE1A6-A594-9444-8B39-607289D39A15}" sibTransId="{225BFD1D-BC52-B143-828F-382AE9401DD3}"/>
+    <dgm:cxn modelId="{7A861359-693B-8041-9983-1C07C46D1410}" type="presOf" srcId="{D65EF31D-B16F-CF40-A896-9D66DA7D3458}" destId="{7D9AA3E8-8390-2E48-9735-E97C1597D5F0}" srcOrd="0" destOrd="0" presId="urn:microsoft.com/office/officeart/2005/8/layout/list1"/>
+    <dgm:cxn modelId="{6517752D-712A-8F4F-ADCA-9214B8C94789}" srcId="{CEC49DEC-29F7-704F-AFA7-570430518BC0}" destId="{F2BE4290-FAEF-FF49-A400-06D6B16F9F1E}" srcOrd="1" destOrd="0" parTransId="{CCF1CBD3-214D-A54E-BB0E-544352E6D15A}" sibTransId="{5E41C29A-8D87-DE43-BF6B-418C4DA38B5B}"/>
     <dgm:cxn modelId="{509613F8-8388-1C4F-BED0-2915600F9992}" type="presOf" srcId="{050F4C5F-A99C-4244-A973-B7746B9E72DA}" destId="{825716A6-70EB-A147-B456-9BA751B7AB44}" srcOrd="0" destOrd="0" presId="urn:microsoft.com/office/officeart/2005/8/layout/list1"/>
-    <dgm:cxn modelId="{6A936DD8-F853-A147-B8BF-404D6BE0D56E}" srcId="{F2BE4290-FAEF-FF49-A400-06D6B16F9F1E}" destId="{D65EF31D-B16F-CF40-A896-9D66DA7D3458}" srcOrd="0" destOrd="0" parTransId="{A13CE1A6-A594-9444-8B39-607289D39A15}" sibTransId="{225BFD1D-BC52-B143-828F-382AE9401DD3}"/>
-    <dgm:cxn modelId="{53F407C2-AB04-9942-BA39-A7A629CA254A}" srcId="{4B51C2DC-089F-DC4F-9D3B-5F37159BD893}" destId="{8C5C17AB-74AF-864C-97A4-9C52EE74445C}" srcOrd="0" destOrd="0" parTransId="{A47607F0-A8FC-D147-A082-3F91295D9C01}" sibTransId="{8905ACC9-215D-1B45-8E72-85EECB1FFDDE}"/>
-    <dgm:cxn modelId="{CE24C156-2AD3-1446-BED7-AB8BAF976D46}" type="presOf" srcId="{9B149980-5306-8441-B102-35092777BA85}" destId="{064F80DB-9EBB-F549-BBEE-9905D7505777}" srcOrd="0" destOrd="0" presId="urn:microsoft.com/office/officeart/2005/8/layout/list1"/>
-    <dgm:cxn modelId="{5D75B00A-724D-394C-AF20-E6EDFCE5489F}" type="presOf" srcId="{8C5C17AB-74AF-864C-97A4-9C52EE74445C}" destId="{72A53F43-98E3-CB4A-9CC4-7D6E3A7E2D1D}" srcOrd="0" destOrd="0" presId="urn:microsoft.com/office/officeart/2005/8/layout/list1"/>
-    <dgm:cxn modelId="{5DD518E5-ED30-A548-BD3D-6D507B3C18D5}" type="presOf" srcId="{4B51C2DC-089F-DC4F-9D3B-5F37159BD893}" destId="{8F38CEAE-D9A9-264B-AB50-62725BF70CA1}" srcOrd="1" destOrd="0" presId="urn:microsoft.com/office/officeart/2005/8/layout/list1"/>
-    <dgm:cxn modelId="{6517752D-712A-8F4F-ADCA-9214B8C94789}" srcId="{CEC49DEC-29F7-704F-AFA7-570430518BC0}" destId="{F2BE4290-FAEF-FF49-A400-06D6B16F9F1E}" srcOrd="1" destOrd="0" parTransId="{CCF1CBD3-214D-A54E-BB0E-544352E6D15A}" sibTransId="{5E41C29A-8D87-DE43-BF6B-418C4DA38B5B}"/>
-    <dgm:cxn modelId="{A5317015-3D79-EF47-8FBA-B6EE032EB3C1}" srcId="{CEC49DEC-29F7-704F-AFA7-570430518BC0}" destId="{4B51C2DC-089F-DC4F-9D3B-5F37159BD893}" srcOrd="0" destOrd="0" parTransId="{C60A2618-28DF-5146-8038-C3EECF17F428}" sibTransId="{61BF8A95-8825-0641-A783-C3ABDAACE625}"/>
-    <dgm:cxn modelId="{B042DE4E-0FFD-9B47-957D-EBA8F84BB1F5}" type="presOf" srcId="{F2BE4290-FAEF-FF49-A400-06D6B16F9F1E}" destId="{248E57EF-FFDF-CC47-84B7-BA2F63B1E2A8}" srcOrd="1" destOrd="0" presId="urn:microsoft.com/office/officeart/2005/8/layout/list1"/>
-    <dgm:cxn modelId="{3BC73166-C8EC-4840-8486-7227D155AF59}" srcId="{9B149980-5306-8441-B102-35092777BA85}" destId="{050F4C5F-A99C-4244-A973-B7746B9E72DA}" srcOrd="0" destOrd="0" parTransId="{2C951978-DD06-5A48-A9F3-1C62358C8F4B}" sibTransId="{91248C81-3F78-564A-937F-7DA63BC02072}"/>
-    <dgm:cxn modelId="{0F6B9C18-2D06-1149-A1DF-89F34B52AEB4}" type="presOf" srcId="{9B149980-5306-8441-B102-35092777BA85}" destId="{7C78A472-F421-2A4B-AE70-CB431D1BB48A}" srcOrd="1" destOrd="0" presId="urn:microsoft.com/office/officeart/2005/8/layout/list1"/>
-    <dgm:cxn modelId="{E4239912-633C-6F4F-B4A9-F989C5BA464C}" type="presOf" srcId="{F2BE4290-FAEF-FF49-A400-06D6B16F9F1E}" destId="{D1494240-428D-B34C-87DA-3F6DE2747342}" srcOrd="0" destOrd="0" presId="urn:microsoft.com/office/officeart/2005/8/layout/list1"/>
-    <dgm:cxn modelId="{7A861359-693B-8041-9983-1C07C46D1410}" type="presOf" srcId="{D65EF31D-B16F-CF40-A896-9D66DA7D3458}" destId="{7D9AA3E8-8390-2E48-9735-E97C1597D5F0}" srcOrd="0" destOrd="0" presId="urn:microsoft.com/office/officeart/2005/8/layout/list1"/>
-    <dgm:cxn modelId="{15A4C690-FCCF-F44B-B0B3-3ACBAD4FE2DB}" srcId="{CEC49DEC-29F7-704F-AFA7-570430518BC0}" destId="{9B149980-5306-8441-B102-35092777BA85}" srcOrd="2" destOrd="0" parTransId="{560535B4-A026-1244-B491-76B268B4B6BC}" sibTransId="{6F70CDA2-EBD9-F547-A43A-071F49CB11CF}"/>
-    <dgm:cxn modelId="{17018853-05EB-134B-B6F9-C8D998B60007}" type="presOf" srcId="{CEC49DEC-29F7-704F-AFA7-570430518BC0}" destId="{BE54A789-0906-524E-9A8F-7EA99DC78B85}" srcOrd="0" destOrd="0" presId="urn:microsoft.com/office/officeart/2005/8/layout/list1"/>
     <dgm:cxn modelId="{39922B9D-547A-5844-87FA-3B031DD15F28}" type="presParOf" srcId="{BE54A789-0906-524E-9A8F-7EA99DC78B85}" destId="{842D559A-A435-C44B-8C1C-4B39215A6A1F}" srcOrd="0" destOrd="0" presId="urn:microsoft.com/office/officeart/2005/8/layout/list1"/>
     <dgm:cxn modelId="{4145CE76-A38B-7940-99BF-EBDE7F029AE7}" type="presParOf" srcId="{842D559A-A435-C44B-8C1C-4B39215A6A1F}" destId="{CA7FE6FA-D771-0140-8640-7276F1908E21}" srcOrd="0" destOrd="0" presId="urn:microsoft.com/office/officeart/2005/8/layout/list1"/>
     <dgm:cxn modelId="{FD39FF9D-C533-1B4D-80CA-B5B5CBDE982E}" type="presParOf" srcId="{842D559A-A435-C44B-8C1C-4B39215A6A1F}" destId="{8F38CEAE-D9A9-264B-AB50-62725BF70CA1}" srcOrd="1" destOrd="0" presId="urn:microsoft.com/office/officeart/2005/8/layout/list1"/>
@@ -1666,7 +1742,15 @@
           </a:pPr>
           <a:r>
             <a:rPr lang="en-US" sz="2400" kern="1200" dirty="0" smtClean="0"/>
-            <a:t>Modeling Material in High Order Element</a:t>
+            <a:t>Modeling Material in </a:t>
+          </a:r>
+          <a:r>
+            <a:rPr lang="en-US" sz="2400" kern="1200" smtClean="0"/>
+            <a:t>High </a:t>
+          </a:r>
+          <a:r>
+            <a:rPr lang="en-US" sz="2400" kern="1200" smtClean="0"/>
+            <a:t>Order Finite Elements</a:t>
           </a:r>
           <a:endParaRPr lang="en-US" sz="2400" kern="1200" dirty="0"/>
         </a:p>
@@ -3323,7 +3407,7 @@
           <a:p>
             <a:fld id="{6EC7B925-F0B5-8940-A15D-31AC0BB6DFB1}" type="datetimeFigureOut">
               <a:rPr lang="en-US" smtClean="0"/>
-              <a:t>6/21/17</a:t>
+              <a:t>2/6/18</a:t>
             </a:fld>
             <a:endParaRPr lang="en-US"/>
           </a:p>
@@ -3493,7 +3577,7 @@
           <a:p>
             <a:fld id="{6EC7B925-F0B5-8940-A15D-31AC0BB6DFB1}" type="datetimeFigureOut">
               <a:rPr lang="en-US" smtClean="0"/>
-              <a:t>6/21/17</a:t>
+              <a:t>2/6/18</a:t>
             </a:fld>
             <a:endParaRPr lang="en-US"/>
           </a:p>
@@ -3673,7 +3757,7 @@
           <a:p>
             <a:fld id="{6EC7B925-F0B5-8940-A15D-31AC0BB6DFB1}" type="datetimeFigureOut">
               <a:rPr lang="en-US" smtClean="0"/>
-              <a:t>6/21/17</a:t>
+              <a:t>2/6/18</a:t>
             </a:fld>
             <a:endParaRPr lang="en-US"/>
           </a:p>
@@ -3843,7 +3927,7 @@
           <a:p>
             <a:fld id="{6EC7B925-F0B5-8940-A15D-31AC0BB6DFB1}" type="datetimeFigureOut">
               <a:rPr lang="en-US" smtClean="0"/>
-              <a:t>6/21/17</a:t>
+              <a:t>2/6/18</a:t>
             </a:fld>
             <a:endParaRPr lang="en-US"/>
           </a:p>
@@ -4089,7 +4173,7 @@
           <a:p>
             <a:fld id="{6EC7B925-F0B5-8940-A15D-31AC0BB6DFB1}" type="datetimeFigureOut">
               <a:rPr lang="en-US" smtClean="0"/>
-              <a:t>6/21/17</a:t>
+              <a:t>2/6/18</a:t>
             </a:fld>
             <a:endParaRPr lang="en-US"/>
           </a:p>
@@ -4321,7 +4405,7 @@
           <a:p>
             <a:fld id="{6EC7B925-F0B5-8940-A15D-31AC0BB6DFB1}" type="datetimeFigureOut">
               <a:rPr lang="en-US" smtClean="0"/>
-              <a:t>6/21/17</a:t>
+              <a:t>2/6/18</a:t>
             </a:fld>
             <a:endParaRPr lang="en-US"/>
           </a:p>
@@ -4688,7 +4772,7 @@
           <a:p>
             <a:fld id="{6EC7B925-F0B5-8940-A15D-31AC0BB6DFB1}" type="datetimeFigureOut">
               <a:rPr lang="en-US" smtClean="0"/>
-              <a:t>6/21/17</a:t>
+              <a:t>2/6/18</a:t>
             </a:fld>
             <a:endParaRPr lang="en-US"/>
           </a:p>
@@ -4806,7 +4890,7 @@
           <a:p>
             <a:fld id="{6EC7B925-F0B5-8940-A15D-31AC0BB6DFB1}" type="datetimeFigureOut">
               <a:rPr lang="en-US" smtClean="0"/>
-              <a:t>6/21/17</a:t>
+              <a:t>2/6/18</a:t>
             </a:fld>
             <a:endParaRPr lang="en-US"/>
           </a:p>
@@ -4901,7 +4985,7 @@
           <a:p>
             <a:fld id="{6EC7B925-F0B5-8940-A15D-31AC0BB6DFB1}" type="datetimeFigureOut">
               <a:rPr lang="en-US" smtClean="0"/>
-              <a:t>6/21/17</a:t>
+              <a:t>2/6/18</a:t>
             </a:fld>
             <a:endParaRPr lang="en-US"/>
           </a:p>
@@ -5178,7 +5262,7 @@
           <a:p>
             <a:fld id="{6EC7B925-F0B5-8940-A15D-31AC0BB6DFB1}" type="datetimeFigureOut">
               <a:rPr lang="en-US" smtClean="0"/>
-              <a:t>6/21/17</a:t>
+              <a:t>2/6/18</a:t>
             </a:fld>
             <a:endParaRPr lang="en-US"/>
           </a:p>
@@ -5431,7 +5515,7 @@
           <a:p>
             <a:fld id="{6EC7B925-F0B5-8940-A15D-31AC0BB6DFB1}" type="datetimeFigureOut">
               <a:rPr lang="en-US" smtClean="0"/>
-              <a:t>6/21/17</a:t>
+              <a:t>2/6/18</a:t>
             </a:fld>
             <a:endParaRPr lang="en-US"/>
           </a:p>
@@ -5644,7 +5728,7 @@
           <a:p>
             <a:fld id="{6EC7B925-F0B5-8940-A15D-31AC0BB6DFB1}" type="datetimeFigureOut">
               <a:rPr lang="en-US" smtClean="0"/>
-              <a:t>6/21/17</a:t>
+              <a:t>2/6/18</a:t>
             </a:fld>
             <a:endParaRPr lang="en-US"/>
           </a:p>
@@ -6056,7 +6140,7 @@
           <p:nvPr>
             <p:extLst>
               <p:ext uri="{D42A27DB-BD31-4B8C-83A1-F6EECF244321}">
-                <p14:modId xmlns:p14="http://schemas.microsoft.com/office/powerpoint/2010/main" val="1760572626"/>
+                <p14:modId xmlns:p14="http://schemas.microsoft.com/office/powerpoint/2010/main" val="157040557"/>
               </p:ext>
             </p:extLst>
           </p:nvPr>

</xml_diff>